<commit_message>
Start of day commit
</commit_message>
<xml_diff>
--- a/data_feedback.pptx
+++ b/data_feedback.pptx
@@ -107,6 +107,11 @@
       </a:defRPr>
     </a:lvl9pPr>
   </p:defaultTextStyle>
+  <p:extLst>
+    <p:ext uri="{EFAFB233-063F-42B5-8137-9DF3F51BA10A}">
+      <p15:sldGuideLst xmlns:p15="http://schemas.microsoft.com/office/powerpoint/2012/main"/>
+    </p:ext>
+  </p:extLst>
 </p:presentation>
 </file>
 
@@ -192,7 +197,7 @@
           <a:p>
             <a:fld id="{B2E53FB0-3606-4374-B6FF-65122C6F8A53}" type="datetimeFigureOut">
               <a:rPr lang="en-GB" smtClean="0"/>
-              <a:t>05/03/2025</a:t>
+              <a:t>18/03/2025</a:t>
             </a:fld>
             <a:endParaRPr lang="en-GB"/>
           </a:p>
@@ -705,7 +710,7 @@
           <a:p>
             <a:fld id="{62F7C729-EC50-4B31-BB4A-5FBDF33BC115}" type="datetimeFigureOut">
               <a:rPr lang="en-GB" smtClean="0"/>
-              <a:t>05/03/2025</a:t>
+              <a:t>18/03/2025</a:t>
             </a:fld>
             <a:endParaRPr lang="en-GB"/>
           </a:p>
@@ -905,7 +910,7 @@
           <a:p>
             <a:fld id="{62F7C729-EC50-4B31-BB4A-5FBDF33BC115}" type="datetimeFigureOut">
               <a:rPr lang="en-GB" smtClean="0"/>
-              <a:t>05/03/2025</a:t>
+              <a:t>18/03/2025</a:t>
             </a:fld>
             <a:endParaRPr lang="en-GB"/>
           </a:p>
@@ -1115,7 +1120,7 @@
           <a:p>
             <a:fld id="{62F7C729-EC50-4B31-BB4A-5FBDF33BC115}" type="datetimeFigureOut">
               <a:rPr lang="en-GB" smtClean="0"/>
-              <a:t>05/03/2025</a:t>
+              <a:t>18/03/2025</a:t>
             </a:fld>
             <a:endParaRPr lang="en-GB"/>
           </a:p>
@@ -1315,7 +1320,7 @@
           <a:p>
             <a:fld id="{62F7C729-EC50-4B31-BB4A-5FBDF33BC115}" type="datetimeFigureOut">
               <a:rPr lang="en-GB" smtClean="0"/>
-              <a:t>05/03/2025</a:t>
+              <a:t>18/03/2025</a:t>
             </a:fld>
             <a:endParaRPr lang="en-GB"/>
           </a:p>
@@ -1591,7 +1596,7 @@
           <a:p>
             <a:fld id="{62F7C729-EC50-4B31-BB4A-5FBDF33BC115}" type="datetimeFigureOut">
               <a:rPr lang="en-GB" smtClean="0"/>
-              <a:t>05/03/2025</a:t>
+              <a:t>18/03/2025</a:t>
             </a:fld>
             <a:endParaRPr lang="en-GB"/>
           </a:p>
@@ -1859,7 +1864,7 @@
           <a:p>
             <a:fld id="{62F7C729-EC50-4B31-BB4A-5FBDF33BC115}" type="datetimeFigureOut">
               <a:rPr lang="en-GB" smtClean="0"/>
-              <a:t>05/03/2025</a:t>
+              <a:t>18/03/2025</a:t>
             </a:fld>
             <a:endParaRPr lang="en-GB"/>
           </a:p>
@@ -2274,7 +2279,7 @@
           <a:p>
             <a:fld id="{62F7C729-EC50-4B31-BB4A-5FBDF33BC115}" type="datetimeFigureOut">
               <a:rPr lang="en-GB" smtClean="0"/>
-              <a:t>05/03/2025</a:t>
+              <a:t>18/03/2025</a:t>
             </a:fld>
             <a:endParaRPr lang="en-GB"/>
           </a:p>
@@ -2416,7 +2421,7 @@
           <a:p>
             <a:fld id="{62F7C729-EC50-4B31-BB4A-5FBDF33BC115}" type="datetimeFigureOut">
               <a:rPr lang="en-GB" smtClean="0"/>
-              <a:t>05/03/2025</a:t>
+              <a:t>18/03/2025</a:t>
             </a:fld>
             <a:endParaRPr lang="en-GB"/>
           </a:p>
@@ -2529,7 +2534,7 @@
           <a:p>
             <a:fld id="{62F7C729-EC50-4B31-BB4A-5FBDF33BC115}" type="datetimeFigureOut">
               <a:rPr lang="en-GB" smtClean="0"/>
-              <a:t>05/03/2025</a:t>
+              <a:t>18/03/2025</a:t>
             </a:fld>
             <a:endParaRPr lang="en-GB"/>
           </a:p>
@@ -2842,7 +2847,7 @@
           <a:p>
             <a:fld id="{62F7C729-EC50-4B31-BB4A-5FBDF33BC115}" type="datetimeFigureOut">
               <a:rPr lang="en-GB" smtClean="0"/>
-              <a:t>05/03/2025</a:t>
+              <a:t>18/03/2025</a:t>
             </a:fld>
             <a:endParaRPr lang="en-GB"/>
           </a:p>
@@ -3131,7 +3136,7 @@
           <a:p>
             <a:fld id="{62F7C729-EC50-4B31-BB4A-5FBDF33BC115}" type="datetimeFigureOut">
               <a:rPr lang="en-GB" smtClean="0"/>
-              <a:t>05/03/2025</a:t>
+              <a:t>18/03/2025</a:t>
             </a:fld>
             <a:endParaRPr lang="en-GB"/>
           </a:p>
@@ -3374,7 +3379,7 @@
           <a:p>
             <a:fld id="{62F7C729-EC50-4B31-BB4A-5FBDF33BC115}" type="datetimeFigureOut">
               <a:rPr lang="en-GB" smtClean="0"/>
-              <a:t>05/03/2025</a:t>
+              <a:t>18/03/2025</a:t>
             </a:fld>
             <a:endParaRPr lang="en-GB"/>
           </a:p>

</xml_diff>